<commit_message>
RUMO A FINALIZACAO 1
</commit_message>
<xml_diff>
--- a/Stud+/modelos/Logos.pptx
+++ b/Stud+/modelos/Logos.pptx
@@ -245,7 +245,7 @@
           <a:p>
             <a:fld id="{2E3565AC-2010-4826-AD28-955C7DE3B687}" type="datetimeFigureOut">
               <a:rPr lang="pt-BR" smtClean="0"/>
-              <a:t>20/10/2018</a:t>
+              <a:t>21/10/2018</a:t>
             </a:fld>
             <a:endParaRPr lang="pt-BR"/>
           </a:p>
@@ -864,7 +864,7 @@
           <a:p>
             <a:fld id="{EC480AC6-A53D-47BC-9837-AD279F9F4920}" type="datetimeFigureOut">
               <a:rPr lang="pt-BR" smtClean="0"/>
-              <a:t>20/10/2018</a:t>
+              <a:t>21/10/2018</a:t>
             </a:fld>
             <a:endParaRPr lang="pt-BR"/>
           </a:p>
@@ -1032,7 +1032,7 @@
           <a:p>
             <a:fld id="{EC480AC6-A53D-47BC-9837-AD279F9F4920}" type="datetimeFigureOut">
               <a:rPr lang="pt-BR" smtClean="0"/>
-              <a:t>20/10/2018</a:t>
+              <a:t>21/10/2018</a:t>
             </a:fld>
             <a:endParaRPr lang="pt-BR"/>
           </a:p>
@@ -1210,7 +1210,7 @@
           <a:p>
             <a:fld id="{EC480AC6-A53D-47BC-9837-AD279F9F4920}" type="datetimeFigureOut">
               <a:rPr lang="pt-BR" smtClean="0"/>
-              <a:t>20/10/2018</a:t>
+              <a:t>21/10/2018</a:t>
             </a:fld>
             <a:endParaRPr lang="pt-BR"/>
           </a:p>
@@ -1378,7 +1378,7 @@
           <a:p>
             <a:fld id="{EC480AC6-A53D-47BC-9837-AD279F9F4920}" type="datetimeFigureOut">
               <a:rPr lang="pt-BR" smtClean="0"/>
-              <a:t>20/10/2018</a:t>
+              <a:t>21/10/2018</a:t>
             </a:fld>
             <a:endParaRPr lang="pt-BR"/>
           </a:p>
@@ -1623,7 +1623,7 @@
           <a:p>
             <a:fld id="{EC480AC6-A53D-47BC-9837-AD279F9F4920}" type="datetimeFigureOut">
               <a:rPr lang="pt-BR" smtClean="0"/>
-              <a:t>20/10/2018</a:t>
+              <a:t>21/10/2018</a:t>
             </a:fld>
             <a:endParaRPr lang="pt-BR"/>
           </a:p>
@@ -1908,7 +1908,7 @@
           <a:p>
             <a:fld id="{EC480AC6-A53D-47BC-9837-AD279F9F4920}" type="datetimeFigureOut">
               <a:rPr lang="pt-BR" smtClean="0"/>
-              <a:t>20/10/2018</a:t>
+              <a:t>21/10/2018</a:t>
             </a:fld>
             <a:endParaRPr lang="pt-BR"/>
           </a:p>
@@ -2327,7 +2327,7 @@
           <a:p>
             <a:fld id="{EC480AC6-A53D-47BC-9837-AD279F9F4920}" type="datetimeFigureOut">
               <a:rPr lang="pt-BR" smtClean="0"/>
-              <a:t>20/10/2018</a:t>
+              <a:t>21/10/2018</a:t>
             </a:fld>
             <a:endParaRPr lang="pt-BR"/>
           </a:p>
@@ -2444,7 +2444,7 @@
           <a:p>
             <a:fld id="{EC480AC6-A53D-47BC-9837-AD279F9F4920}" type="datetimeFigureOut">
               <a:rPr lang="pt-BR" smtClean="0"/>
-              <a:t>20/10/2018</a:t>
+              <a:t>21/10/2018</a:t>
             </a:fld>
             <a:endParaRPr lang="pt-BR"/>
           </a:p>
@@ -2539,7 +2539,7 @@
           <a:p>
             <a:fld id="{EC480AC6-A53D-47BC-9837-AD279F9F4920}" type="datetimeFigureOut">
               <a:rPr lang="pt-BR" smtClean="0"/>
-              <a:t>20/10/2018</a:t>
+              <a:t>21/10/2018</a:t>
             </a:fld>
             <a:endParaRPr lang="pt-BR"/>
           </a:p>
@@ -2814,7 +2814,7 @@
           <a:p>
             <a:fld id="{EC480AC6-A53D-47BC-9837-AD279F9F4920}" type="datetimeFigureOut">
               <a:rPr lang="pt-BR" smtClean="0"/>
-              <a:t>20/10/2018</a:t>
+              <a:t>21/10/2018</a:t>
             </a:fld>
             <a:endParaRPr lang="pt-BR"/>
           </a:p>
@@ -3066,7 +3066,7 @@
           <a:p>
             <a:fld id="{EC480AC6-A53D-47BC-9837-AD279F9F4920}" type="datetimeFigureOut">
               <a:rPr lang="pt-BR" smtClean="0"/>
-              <a:t>20/10/2018</a:t>
+              <a:t>21/10/2018</a:t>
             </a:fld>
             <a:endParaRPr lang="pt-BR"/>
           </a:p>
@@ -3277,7 +3277,7 @@
           <a:p>
             <a:fld id="{EC480AC6-A53D-47BC-9837-AD279F9F4920}" type="datetimeFigureOut">
               <a:rPr lang="pt-BR" smtClean="0"/>
-              <a:t>20/10/2018</a:t>
+              <a:t>21/10/2018</a:t>
             </a:fld>
             <a:endParaRPr lang="pt-BR"/>
           </a:p>
@@ -6212,10 +6212,10 @@
       </p:grpSpPr>
       <p:grpSp>
         <p:nvGrpSpPr>
-          <p:cNvPr id="4" name="Agrupar 3">
+          <p:cNvPr id="69" name="Agrupar 68">
             <a:extLst>
               <a:ext uri="{FF2B5EF4-FFF2-40B4-BE49-F238E27FC236}">
-                <a16:creationId xmlns:a16="http://schemas.microsoft.com/office/drawing/2014/main" id="{D7C0B00C-161C-4ABE-A47A-D533F1A6BB89}"/>
+                <a16:creationId xmlns:a16="http://schemas.microsoft.com/office/drawing/2014/main" id="{D595446C-3A32-4066-B7A2-A149C55A9CDD}"/>
               </a:ext>
             </a:extLst>
           </p:cNvPr>
@@ -6224,218 +6224,197 @@
         </p:nvGrpSpPr>
         <p:grpSpPr>
           <a:xfrm>
-            <a:off x="8975414" y="3791746"/>
-            <a:ext cx="3723314" cy="4390239"/>
-            <a:chOff x="4234341" y="833306"/>
-            <a:chExt cx="3723314" cy="4390239"/>
+            <a:off x="7236670" y="2207568"/>
+            <a:ext cx="936103" cy="923946"/>
+            <a:chOff x="12790808" y="2894193"/>
+            <a:chExt cx="5544616" cy="5472608"/>
           </a:xfrm>
-          <a:solidFill>
-            <a:srgbClr val="007BD0"/>
-          </a:solidFill>
         </p:grpSpPr>
-        <p:pic>
-          <p:nvPicPr>
-            <p:cNvPr id="5" name="Gráfico 4" descr="Usuário">
+        <p:grpSp>
+          <p:nvGrpSpPr>
+            <p:cNvPr id="26" name="Agrupar 25">
               <a:extLst>
                 <a:ext uri="{FF2B5EF4-FFF2-40B4-BE49-F238E27FC236}">
-                  <a16:creationId xmlns:a16="http://schemas.microsoft.com/office/drawing/2014/main" id="{A0CA1125-C2CF-49A8-9AE9-7CBD1BF491B9}"/>
+                  <a16:creationId xmlns:a16="http://schemas.microsoft.com/office/drawing/2014/main" id="{02B1F211-CB48-47BC-B170-A73543E90D48}"/>
                 </a:ext>
               </a:extLst>
             </p:cNvPr>
-            <p:cNvPicPr>
-              <a:picLocks noChangeAspect="1"/>
-            </p:cNvPicPr>
+            <p:cNvGrpSpPr/>
             <p:nvPr/>
-          </p:nvPicPr>
-          <p:blipFill>
-            <a:blip r:embed="rId2">
-              <a:extLst>
-                <a:ext uri="{28A0092B-C50C-407E-A947-70E740481C1C}">
-                  <a14:useLocalDpi xmlns:a14="http://schemas.microsoft.com/office/drawing/2010/main" val="0"/>
-                </a:ext>
-                <a:ext uri="{96DAC541-7B7A-43D3-8B79-37D633B846F1}">
-                  <asvg:svgBlip xmlns:asvg="http://schemas.microsoft.com/office/drawing/2016/SVG/main" r:embed="rId3"/>
-                </a:ext>
-              </a:extLst>
-            </a:blip>
-            <a:stretch>
-              <a:fillRect/>
-            </a:stretch>
-          </p:blipFill>
-          <p:spPr>
-            <a:xfrm>
-              <a:off x="4234341" y="1500231"/>
-              <a:ext cx="3723314" cy="3723314"/>
+          </p:nvGrpSpPr>
+          <p:grpSpPr>
+            <a:xfrm rot="2227636">
+              <a:off x="12790808" y="2894193"/>
+              <a:ext cx="5544616" cy="5472608"/>
+              <a:chOff x="8028757" y="2855640"/>
+              <a:chExt cx="5544616" cy="5472608"/>
             </a:xfrm>
-            <a:prstGeom prst="rect">
-              <a:avLst/>
-            </a:prstGeom>
-          </p:spPr>
-        </p:pic>
-        <p:sp>
-          <p:nvSpPr>
-            <p:cNvPr id="6" name="Retângulo 5">
+            <a:effectLst>
+              <a:outerShdw blurRad="50800" dist="38100" dir="5400000" sx="101000" sy="101000" algn="t" rotWithShape="0">
+                <a:prstClr val="black">
+                  <a:alpha val="40000"/>
+                </a:prstClr>
+              </a:outerShdw>
+            </a:effectLst>
+          </p:grpSpPr>
+          <p:sp>
+            <p:nvSpPr>
+              <p:cNvPr id="2" name="Elipse 1">
+                <a:extLst>
+                  <a:ext uri="{FF2B5EF4-FFF2-40B4-BE49-F238E27FC236}">
+                    <a16:creationId xmlns:a16="http://schemas.microsoft.com/office/drawing/2014/main" id="{00EFEC5F-6090-4436-B4B0-9D1AD19FAD5A}"/>
+                  </a:ext>
+                </a:extLst>
+              </p:cNvPr>
+              <p:cNvSpPr/>
+              <p:nvPr/>
+            </p:nvSpPr>
+            <p:spPr>
+              <a:xfrm>
+                <a:off x="8100765" y="2855640"/>
+                <a:ext cx="5472608" cy="5472608"/>
+              </a:xfrm>
+              <a:prstGeom prst="ellipse">
+                <a:avLst/>
+              </a:prstGeom>
+              <a:solidFill>
+                <a:srgbClr val="1DAFA8"/>
+              </a:solidFill>
+              <a:ln>
+                <a:noFill/>
+              </a:ln>
+            </p:spPr>
+            <p:style>
+              <a:lnRef idx="2">
+                <a:schemeClr val="accent1">
+                  <a:shade val="50000"/>
+                </a:schemeClr>
+              </a:lnRef>
+              <a:fillRef idx="1">
+                <a:schemeClr val="accent1"/>
+              </a:fillRef>
+              <a:effectRef idx="0">
+                <a:schemeClr val="accent1"/>
+              </a:effectRef>
+              <a:fontRef idx="minor">
+                <a:schemeClr val="lt1"/>
+              </a:fontRef>
+            </p:style>
+            <p:txBody>
+              <a:bodyPr rtlCol="0" anchor="ctr"/>
+              <a:lstStyle/>
+              <a:p>
+                <a:pPr algn="ctr"/>
+                <a:endParaRPr lang="pt-BR"/>
+              </a:p>
+            </p:txBody>
+          </p:sp>
+          <p:sp>
+            <p:nvSpPr>
+              <p:cNvPr id="25" name="Forma Livre: Forma 24">
+                <a:extLst>
+                  <a:ext uri="{FF2B5EF4-FFF2-40B4-BE49-F238E27FC236}">
+                    <a16:creationId xmlns:a16="http://schemas.microsoft.com/office/drawing/2014/main" id="{56B21A8E-9CF2-485B-B798-EDFBD76D5C56}"/>
+                  </a:ext>
+                </a:extLst>
+              </p:cNvPr>
+              <p:cNvSpPr/>
+              <p:nvPr/>
+            </p:nvSpPr>
+            <p:spPr>
+              <a:xfrm>
+                <a:off x="8028757" y="2855640"/>
+                <a:ext cx="2736304" cy="5472608"/>
+              </a:xfrm>
+              <a:custGeom>
+                <a:avLst/>
+                <a:gdLst>
+                  <a:gd name="connsiteX0" fmla="*/ 2736304 w 2736304"/>
+                  <a:gd name="connsiteY0" fmla="*/ 0 h 5472608"/>
+                  <a:gd name="connsiteX1" fmla="*/ 2736304 w 2736304"/>
+                  <a:gd name="connsiteY1" fmla="*/ 5472608 h 5472608"/>
+                  <a:gd name="connsiteX2" fmla="*/ 0 w 2736304"/>
+                  <a:gd name="connsiteY2" fmla="*/ 2736304 h 5472608"/>
+                  <a:gd name="connsiteX3" fmla="*/ 2736304 w 2736304"/>
+                  <a:gd name="connsiteY3" fmla="*/ 0 h 5472608"/>
+                </a:gdLst>
+                <a:ahLst/>
+                <a:cxnLst>
+                  <a:cxn ang="0">
+                    <a:pos x="connsiteX0" y="connsiteY0"/>
+                  </a:cxn>
+                  <a:cxn ang="0">
+                    <a:pos x="connsiteX1" y="connsiteY1"/>
+                  </a:cxn>
+                  <a:cxn ang="0">
+                    <a:pos x="connsiteX2" y="connsiteY2"/>
+                  </a:cxn>
+                  <a:cxn ang="0">
+                    <a:pos x="connsiteX3" y="connsiteY3"/>
+                  </a:cxn>
+                </a:cxnLst>
+                <a:rect l="l" t="t" r="r" b="b"/>
+                <a:pathLst>
+                  <a:path w="2736304" h="5472608">
+                    <a:moveTo>
+                      <a:pt x="2736304" y="0"/>
+                    </a:moveTo>
+                    <a:lnTo>
+                      <a:pt x="2736304" y="5472608"/>
+                    </a:lnTo>
+                    <a:cubicBezTo>
+                      <a:pt x="1225085" y="5472608"/>
+                      <a:pt x="0" y="4247523"/>
+                      <a:pt x="0" y="2736304"/>
+                    </a:cubicBezTo>
+                    <a:cubicBezTo>
+                      <a:pt x="0" y="1225085"/>
+                      <a:pt x="1225085" y="0"/>
+                      <a:pt x="2736304" y="0"/>
+                    </a:cubicBezTo>
+                    <a:close/>
+                  </a:path>
+                </a:pathLst>
+              </a:custGeom>
+              <a:solidFill>
+                <a:srgbClr val="1FBFB7"/>
+              </a:solidFill>
+              <a:ln>
+                <a:noFill/>
+              </a:ln>
+            </p:spPr>
+            <p:style>
+              <a:lnRef idx="2">
+                <a:schemeClr val="accent1">
+                  <a:shade val="50000"/>
+                </a:schemeClr>
+              </a:lnRef>
+              <a:fillRef idx="1">
+                <a:schemeClr val="accent1"/>
+              </a:fillRef>
+              <a:effectRef idx="0">
+                <a:schemeClr val="accent1"/>
+              </a:effectRef>
+              <a:fontRef idx="minor">
+                <a:schemeClr val="lt1"/>
+              </a:fontRef>
+            </p:style>
+            <p:txBody>
+              <a:bodyPr rtlCol="0" anchor="ctr"/>
+              <a:lstStyle/>
+              <a:p>
+                <a:pPr algn="ctr"/>
+                <a:endParaRPr lang="pt-BR"/>
+              </a:p>
+            </p:txBody>
+          </p:sp>
+        </p:grpSp>
+        <p:grpSp>
+          <p:nvGrpSpPr>
+            <p:cNvPr id="4" name="Agrupar 3">
               <a:extLst>
                 <a:ext uri="{FF2B5EF4-FFF2-40B4-BE49-F238E27FC236}">
-                  <a16:creationId xmlns:a16="http://schemas.microsoft.com/office/drawing/2014/main" id="{3DD69A3F-0C3D-4962-A956-2D9ED1AA114B}"/>
-                </a:ext>
-              </a:extLst>
-            </p:cNvPr>
-            <p:cNvSpPr/>
-            <p:nvPr/>
-          </p:nvSpPr>
-          <p:spPr>
-            <a:xfrm>
-              <a:off x="5210960" y="833306"/>
-              <a:ext cx="1770077" cy="1770077"/>
-            </a:xfrm>
-            <a:prstGeom prst="rect">
-              <a:avLst/>
-            </a:prstGeom>
-            <a:grpFill/>
-            <a:ln>
-              <a:noFill/>
-            </a:ln>
-            <a:scene3d>
-              <a:camera prst="isometricTopUp"/>
-              <a:lightRig rig="threePt" dir="t"/>
-            </a:scene3d>
-          </p:spPr>
-          <p:style>
-            <a:lnRef idx="2">
-              <a:schemeClr val="accent1">
-                <a:shade val="50000"/>
-              </a:schemeClr>
-            </a:lnRef>
-            <a:fillRef idx="1">
-              <a:schemeClr val="accent1"/>
-            </a:fillRef>
-            <a:effectRef idx="0">
-              <a:schemeClr val="accent1"/>
-            </a:effectRef>
-            <a:fontRef idx="minor">
-              <a:schemeClr val="lt1"/>
-            </a:fontRef>
-          </p:style>
-          <p:txBody>
-            <a:bodyPr rtlCol="0" anchor="ctr"/>
-            <a:lstStyle/>
-            <a:p>
-              <a:pPr algn="ctr"/>
-              <a:endParaRPr lang="pt-BR"/>
-            </a:p>
-          </p:txBody>
-        </p:sp>
-        <p:sp>
-          <p:nvSpPr>
-            <p:cNvPr id="7" name="Retângulo: Cantos Arredondados 6">
-              <a:extLst>
-                <a:ext uri="{FF2B5EF4-FFF2-40B4-BE49-F238E27FC236}">
-                  <a16:creationId xmlns:a16="http://schemas.microsoft.com/office/drawing/2014/main" id="{52EE2D45-D0FA-4F34-95F6-04D56E423317}"/>
-                </a:ext>
-              </a:extLst>
-            </p:cNvPr>
-            <p:cNvSpPr/>
-            <p:nvPr/>
-          </p:nvSpPr>
-          <p:spPr>
-            <a:xfrm>
-              <a:off x="5513663" y="1957430"/>
-              <a:ext cx="1164673" cy="494951"/>
-            </a:xfrm>
-            <a:prstGeom prst="roundRect">
-              <a:avLst>
-                <a:gd name="adj" fmla="val 23447"/>
-              </a:avLst>
-            </a:prstGeom>
-            <a:grpFill/>
-            <a:ln>
-              <a:noFill/>
-            </a:ln>
-          </p:spPr>
-          <p:style>
-            <a:lnRef idx="2">
-              <a:schemeClr val="accent1">
-                <a:shade val="50000"/>
-              </a:schemeClr>
-            </a:lnRef>
-            <a:fillRef idx="1">
-              <a:schemeClr val="accent1"/>
-            </a:fillRef>
-            <a:effectRef idx="0">
-              <a:schemeClr val="accent1"/>
-            </a:effectRef>
-            <a:fontRef idx="minor">
-              <a:schemeClr val="lt1"/>
-            </a:fontRef>
-          </p:style>
-          <p:txBody>
-            <a:bodyPr rtlCol="0" anchor="ctr"/>
-            <a:lstStyle/>
-            <a:p>
-              <a:pPr algn="ctr"/>
-              <a:endParaRPr lang="pt-BR"/>
-            </a:p>
-          </p:txBody>
-        </p:sp>
-        <p:sp>
-          <p:nvSpPr>
-            <p:cNvPr id="8" name="Retângulo: Cantos Arredondados 7">
-              <a:extLst>
-                <a:ext uri="{FF2B5EF4-FFF2-40B4-BE49-F238E27FC236}">
-                  <a16:creationId xmlns:a16="http://schemas.microsoft.com/office/drawing/2014/main" id="{8EC0EE8C-2C28-44B0-B9FE-03E147A8199A}"/>
-                </a:ext>
-              </a:extLst>
-            </p:cNvPr>
-            <p:cNvSpPr/>
-            <p:nvPr/>
-          </p:nvSpPr>
-          <p:spPr>
-            <a:xfrm>
-              <a:off x="5026053" y="1634455"/>
-              <a:ext cx="67112" cy="679508"/>
-            </a:xfrm>
-            <a:prstGeom prst="roundRect">
-              <a:avLst>
-                <a:gd name="adj" fmla="val 50000"/>
-              </a:avLst>
-            </a:prstGeom>
-            <a:grpFill/>
-            <a:ln>
-              <a:noFill/>
-            </a:ln>
-          </p:spPr>
-          <p:style>
-            <a:lnRef idx="2">
-              <a:schemeClr val="accent1">
-                <a:shade val="50000"/>
-              </a:schemeClr>
-            </a:lnRef>
-            <a:fillRef idx="1">
-              <a:schemeClr val="accent1"/>
-            </a:fillRef>
-            <a:effectRef idx="0">
-              <a:schemeClr val="accent1"/>
-            </a:effectRef>
-            <a:fontRef idx="minor">
-              <a:schemeClr val="lt1"/>
-            </a:fontRef>
-          </p:style>
-          <p:txBody>
-            <a:bodyPr rtlCol="0" anchor="ctr"/>
-            <a:lstStyle/>
-            <a:p>
-              <a:pPr algn="ctr"/>
-              <a:endParaRPr lang="pt-BR"/>
-            </a:p>
-          </p:txBody>
-        </p:sp>
-        <p:grpSp>
-          <p:nvGrpSpPr>
-            <p:cNvPr id="9" name="Agrupar 8">
-              <a:extLst>
-                <a:ext uri="{FF2B5EF4-FFF2-40B4-BE49-F238E27FC236}">
-                  <a16:creationId xmlns:a16="http://schemas.microsoft.com/office/drawing/2014/main" id="{267C4318-4AB2-4746-9648-43FAC46CA6D1}"/>
+                  <a16:creationId xmlns:a16="http://schemas.microsoft.com/office/drawing/2014/main" id="{D7C0B00C-161C-4ABE-A47A-D533F1A6BB89}"/>
                 </a:ext>
               </a:extLst>
             </p:cNvPr>
@@ -6444,19 +6423,60 @@
           </p:nvGrpSpPr>
           <p:grpSpPr>
             <a:xfrm>
-              <a:off x="4970470" y="2238002"/>
-              <a:ext cx="178278" cy="210185"/>
-              <a:chOff x="997241" y="468386"/>
-              <a:chExt cx="1675809" cy="2446782"/>
+              <a:off x="13726912" y="3542265"/>
+              <a:ext cx="3723314" cy="4390239"/>
+              <a:chOff x="4234341" y="833306"/>
+              <a:chExt cx="3723314" cy="4390239"/>
             </a:xfrm>
-            <a:grpFill/>
+            <a:solidFill>
+              <a:schemeClr val="bg1"/>
+            </a:solidFill>
           </p:grpSpPr>
+          <p:pic>
+            <p:nvPicPr>
+              <p:cNvPr id="5" name="Gráfico 4" descr="Usuário">
+                <a:extLst>
+                  <a:ext uri="{FF2B5EF4-FFF2-40B4-BE49-F238E27FC236}">
+                    <a16:creationId xmlns:a16="http://schemas.microsoft.com/office/drawing/2014/main" id="{A0CA1125-C2CF-49A8-9AE9-7CBD1BF491B9}"/>
+                  </a:ext>
+                </a:extLst>
+              </p:cNvPr>
+              <p:cNvPicPr>
+                <a:picLocks noChangeAspect="1"/>
+              </p:cNvPicPr>
+              <p:nvPr/>
+            </p:nvPicPr>
+            <p:blipFill>
+              <a:blip r:embed="rId2">
+                <a:extLst>
+                  <a:ext uri="{28A0092B-C50C-407E-A947-70E740481C1C}">
+                    <a14:useLocalDpi xmlns:a14="http://schemas.microsoft.com/office/drawing/2010/main" val="0"/>
+                  </a:ext>
+                  <a:ext uri="{96DAC541-7B7A-43D3-8B79-37D633B846F1}">
+                    <asvg:svgBlip xmlns:asvg="http://schemas.microsoft.com/office/drawing/2016/SVG/main" r:embed="rId3"/>
+                  </a:ext>
+                </a:extLst>
+              </a:blip>
+              <a:stretch>
+                <a:fillRect/>
+              </a:stretch>
+            </p:blipFill>
+            <p:spPr>
+              <a:xfrm>
+                <a:off x="4234341" y="1500231"/>
+                <a:ext cx="3723314" cy="3723314"/>
+              </a:xfrm>
+              <a:prstGeom prst="rect">
+                <a:avLst/>
+              </a:prstGeom>
+            </p:spPr>
+          </p:pic>
           <p:sp>
             <p:nvSpPr>
-              <p:cNvPr id="10" name="Elipse 9">
+              <p:cNvPr id="6" name="Retângulo 5">
                 <a:extLst>
                   <a:ext uri="{FF2B5EF4-FFF2-40B4-BE49-F238E27FC236}">
-                    <a16:creationId xmlns:a16="http://schemas.microsoft.com/office/drawing/2014/main" id="{8AA4CB02-361D-40B7-B5E9-E7F2EFF87374}"/>
+                    <a16:creationId xmlns:a16="http://schemas.microsoft.com/office/drawing/2014/main" id="{3DD69A3F-0C3D-4962-A956-2D9ED1AA114B}"/>
                   </a:ext>
                 </a:extLst>
               </p:cNvPr>
@@ -6465,11 +6485,120 @@
             </p:nvSpPr>
             <p:spPr>
               <a:xfrm>
-                <a:off x="997241" y="468386"/>
-                <a:ext cx="1675809" cy="2362897"/>
+                <a:off x="5210960" y="833306"/>
+                <a:ext cx="1770077" cy="1770077"/>
               </a:xfrm>
-              <a:prstGeom prst="ellipse">
+              <a:prstGeom prst="rect">
                 <a:avLst/>
+              </a:prstGeom>
+              <a:grpFill/>
+              <a:ln>
+                <a:noFill/>
+              </a:ln>
+              <a:scene3d>
+                <a:camera prst="isometricTopUp"/>
+                <a:lightRig rig="threePt" dir="t"/>
+              </a:scene3d>
+            </p:spPr>
+            <p:style>
+              <a:lnRef idx="2">
+                <a:schemeClr val="accent1">
+                  <a:shade val="50000"/>
+                </a:schemeClr>
+              </a:lnRef>
+              <a:fillRef idx="1">
+                <a:schemeClr val="accent1"/>
+              </a:fillRef>
+              <a:effectRef idx="0">
+                <a:schemeClr val="accent1"/>
+              </a:effectRef>
+              <a:fontRef idx="minor">
+                <a:schemeClr val="lt1"/>
+              </a:fontRef>
+            </p:style>
+            <p:txBody>
+              <a:bodyPr rtlCol="0" anchor="ctr"/>
+              <a:lstStyle/>
+              <a:p>
+                <a:pPr algn="ctr"/>
+                <a:endParaRPr lang="pt-BR"/>
+              </a:p>
+            </p:txBody>
+          </p:sp>
+          <p:sp>
+            <p:nvSpPr>
+              <p:cNvPr id="7" name="Retângulo: Cantos Arredondados 6">
+                <a:extLst>
+                  <a:ext uri="{FF2B5EF4-FFF2-40B4-BE49-F238E27FC236}">
+                    <a16:creationId xmlns:a16="http://schemas.microsoft.com/office/drawing/2014/main" id="{52EE2D45-D0FA-4F34-95F6-04D56E423317}"/>
+                  </a:ext>
+                </a:extLst>
+              </p:cNvPr>
+              <p:cNvSpPr/>
+              <p:nvPr/>
+            </p:nvSpPr>
+            <p:spPr>
+              <a:xfrm>
+                <a:off x="5513663" y="1957430"/>
+                <a:ext cx="1164673" cy="494951"/>
+              </a:xfrm>
+              <a:prstGeom prst="roundRect">
+                <a:avLst>
+                  <a:gd name="adj" fmla="val 23447"/>
+                </a:avLst>
+              </a:prstGeom>
+              <a:grpFill/>
+              <a:ln>
+                <a:noFill/>
+              </a:ln>
+              <a:effectLst/>
+            </p:spPr>
+            <p:style>
+              <a:lnRef idx="2">
+                <a:schemeClr val="accent1">
+                  <a:shade val="50000"/>
+                </a:schemeClr>
+              </a:lnRef>
+              <a:fillRef idx="1">
+                <a:schemeClr val="accent1"/>
+              </a:fillRef>
+              <a:effectRef idx="0">
+                <a:schemeClr val="accent1"/>
+              </a:effectRef>
+              <a:fontRef idx="minor">
+                <a:schemeClr val="lt1"/>
+              </a:fontRef>
+            </p:style>
+            <p:txBody>
+              <a:bodyPr rtlCol="0" anchor="ctr"/>
+              <a:lstStyle/>
+              <a:p>
+                <a:pPr algn="ctr"/>
+                <a:endParaRPr lang="pt-BR"/>
+              </a:p>
+            </p:txBody>
+          </p:sp>
+          <p:sp>
+            <p:nvSpPr>
+              <p:cNvPr id="8" name="Retângulo: Cantos Arredondados 7">
+                <a:extLst>
+                  <a:ext uri="{FF2B5EF4-FFF2-40B4-BE49-F238E27FC236}">
+                    <a16:creationId xmlns:a16="http://schemas.microsoft.com/office/drawing/2014/main" id="{8EC0EE8C-2C28-44B0-B9FE-03E147A8199A}"/>
+                  </a:ext>
+                </a:extLst>
+              </p:cNvPr>
+              <p:cNvSpPr/>
+              <p:nvPr/>
+            </p:nvSpPr>
+            <p:spPr>
+              <a:xfrm>
+                <a:off x="5026053" y="1634455"/>
+                <a:ext cx="67112" cy="679508"/>
+              </a:xfrm>
+              <a:prstGeom prst="roundRect">
+                <a:avLst>
+                  <a:gd name="adj" fmla="val 50000"/>
+                </a:avLst>
               </a:prstGeom>
               <a:grpFill/>
               <a:ln>
@@ -6501,656 +6630,728 @@
               </a:p>
             </p:txBody>
           </p:sp>
-          <p:sp>
-            <p:nvSpPr>
-              <p:cNvPr id="11" name="Retângulo: Cantos Arredondados 10">
+          <p:grpSp>
+            <p:nvGrpSpPr>
+              <p:cNvPr id="9" name="Agrupar 8">
                 <a:extLst>
                   <a:ext uri="{FF2B5EF4-FFF2-40B4-BE49-F238E27FC236}">
-                    <a16:creationId xmlns:a16="http://schemas.microsoft.com/office/drawing/2014/main" id="{F73250F2-2986-478D-84CC-876DADF39F25}"/>
+                    <a16:creationId xmlns:a16="http://schemas.microsoft.com/office/drawing/2014/main" id="{267C4318-4AB2-4746-9648-43FAC46CA6D1}"/>
                   </a:ext>
                 </a:extLst>
               </p:cNvPr>
-              <p:cNvSpPr/>
+              <p:cNvGrpSpPr/>
               <p:nvPr/>
-            </p:nvSpPr>
-            <p:spPr>
+            </p:nvGrpSpPr>
+            <p:grpSpPr>
               <a:xfrm>
-                <a:off x="997241" y="1716946"/>
-                <a:ext cx="218114" cy="735435"/>
+                <a:off x="4970470" y="2238002"/>
+                <a:ext cx="178278" cy="210185"/>
+                <a:chOff x="997241" y="468386"/>
+                <a:chExt cx="1675809" cy="2446782"/>
               </a:xfrm>
-              <a:prstGeom prst="roundRect">
-                <a:avLst/>
-              </a:prstGeom>
               <a:grpFill/>
-              <a:ln>
-                <a:noFill/>
-              </a:ln>
-            </p:spPr>
-            <p:style>
-              <a:lnRef idx="2">
-                <a:schemeClr val="accent1">
-                  <a:shade val="50000"/>
-                </a:schemeClr>
-              </a:lnRef>
-              <a:fillRef idx="1">
-                <a:schemeClr val="accent1"/>
-              </a:fillRef>
-              <a:effectRef idx="0">
-                <a:schemeClr val="accent1"/>
-              </a:effectRef>
-              <a:fontRef idx="minor">
-                <a:schemeClr val="lt1"/>
-              </a:fontRef>
-            </p:style>
-            <p:txBody>
-              <a:bodyPr rtlCol="0" anchor="ctr"/>
-              <a:lstStyle/>
-              <a:p>
-                <a:pPr algn="ctr"/>
-                <a:endParaRPr lang="pt-BR"/>
-              </a:p>
-            </p:txBody>
-          </p:sp>
-          <p:sp>
-            <p:nvSpPr>
-              <p:cNvPr id="12" name="Retângulo: Cantos Arredondados 11">
-                <a:extLst>
-                  <a:ext uri="{FF2B5EF4-FFF2-40B4-BE49-F238E27FC236}">
-                    <a16:creationId xmlns:a16="http://schemas.microsoft.com/office/drawing/2014/main" id="{61FF627D-32B0-443C-AF22-BB6C5CF00724}"/>
-                  </a:ext>
-                </a:extLst>
-              </p:cNvPr>
-              <p:cNvSpPr/>
-              <p:nvPr/>
-            </p:nvSpPr>
-            <p:spPr>
-              <a:xfrm>
-                <a:off x="1165196" y="1849772"/>
-                <a:ext cx="218114" cy="735435"/>
-              </a:xfrm>
-              <a:prstGeom prst="roundRect">
-                <a:avLst/>
-              </a:prstGeom>
-              <a:grpFill/>
-              <a:ln>
-                <a:noFill/>
-              </a:ln>
-            </p:spPr>
-            <p:style>
-              <a:lnRef idx="2">
-                <a:schemeClr val="accent1">
-                  <a:shade val="50000"/>
-                </a:schemeClr>
-              </a:lnRef>
-              <a:fillRef idx="1">
-                <a:schemeClr val="accent1"/>
-              </a:fillRef>
-              <a:effectRef idx="0">
-                <a:schemeClr val="accent1"/>
-              </a:effectRef>
-              <a:fontRef idx="minor">
-                <a:schemeClr val="lt1"/>
-              </a:fontRef>
-            </p:style>
-            <p:txBody>
-              <a:bodyPr rtlCol="0" anchor="ctr"/>
-              <a:lstStyle/>
-              <a:p>
-                <a:pPr algn="ctr"/>
-                <a:endParaRPr lang="pt-BR"/>
-              </a:p>
-            </p:txBody>
-          </p:sp>
-          <p:sp>
-            <p:nvSpPr>
-              <p:cNvPr id="13" name="Retângulo: Cantos Arredondados 12">
-                <a:extLst>
-                  <a:ext uri="{FF2B5EF4-FFF2-40B4-BE49-F238E27FC236}">
-                    <a16:creationId xmlns:a16="http://schemas.microsoft.com/office/drawing/2014/main" id="{FCBC6A68-B0BD-4771-B12B-2666385ADC6F}"/>
-                  </a:ext>
-                </a:extLst>
-              </p:cNvPr>
-              <p:cNvSpPr/>
-              <p:nvPr/>
-            </p:nvSpPr>
-            <p:spPr>
-              <a:xfrm>
-                <a:off x="1492323" y="2095848"/>
-                <a:ext cx="218114" cy="735435"/>
-              </a:xfrm>
-              <a:prstGeom prst="roundRect">
-                <a:avLst/>
-              </a:prstGeom>
-              <a:grpFill/>
-              <a:ln>
-                <a:noFill/>
-              </a:ln>
-            </p:spPr>
-            <p:style>
-              <a:lnRef idx="2">
-                <a:schemeClr val="accent1">
-                  <a:shade val="50000"/>
-                </a:schemeClr>
-              </a:lnRef>
-              <a:fillRef idx="1">
-                <a:schemeClr val="accent1"/>
-              </a:fillRef>
-              <a:effectRef idx="0">
-                <a:schemeClr val="accent1"/>
-              </a:effectRef>
-              <a:fontRef idx="minor">
-                <a:schemeClr val="lt1"/>
-              </a:fontRef>
-            </p:style>
-            <p:txBody>
-              <a:bodyPr rtlCol="0" anchor="ctr"/>
-              <a:lstStyle/>
-              <a:p>
-                <a:pPr algn="ctr"/>
-                <a:endParaRPr lang="pt-BR"/>
-              </a:p>
-            </p:txBody>
-          </p:sp>
-          <p:sp>
-            <p:nvSpPr>
-              <p:cNvPr id="14" name="Retângulo: Cantos Arredondados 13">
-                <a:extLst>
-                  <a:ext uri="{FF2B5EF4-FFF2-40B4-BE49-F238E27FC236}">
-                    <a16:creationId xmlns:a16="http://schemas.microsoft.com/office/drawing/2014/main" id="{69F32E65-17C4-4CC9-9EA0-529687A215BF}"/>
-                  </a:ext>
-                </a:extLst>
-              </p:cNvPr>
-              <p:cNvSpPr/>
-              <p:nvPr/>
-            </p:nvSpPr>
-            <p:spPr>
-              <a:xfrm>
-                <a:off x="1149641" y="1869346"/>
-                <a:ext cx="218114" cy="735435"/>
-              </a:xfrm>
-              <a:prstGeom prst="roundRect">
-                <a:avLst/>
-              </a:prstGeom>
-              <a:grpFill/>
-              <a:ln>
-                <a:noFill/>
-              </a:ln>
-            </p:spPr>
-            <p:style>
-              <a:lnRef idx="2">
-                <a:schemeClr val="accent1">
-                  <a:shade val="50000"/>
-                </a:schemeClr>
-              </a:lnRef>
-              <a:fillRef idx="1">
-                <a:schemeClr val="accent1"/>
-              </a:fillRef>
-              <a:effectRef idx="0">
-                <a:schemeClr val="accent1"/>
-              </a:effectRef>
-              <a:fontRef idx="minor">
-                <a:schemeClr val="lt1"/>
-              </a:fontRef>
-            </p:style>
-            <p:txBody>
-              <a:bodyPr rtlCol="0" anchor="ctr"/>
-              <a:lstStyle/>
-              <a:p>
-                <a:pPr algn="ctr"/>
-                <a:endParaRPr lang="pt-BR"/>
-              </a:p>
-            </p:txBody>
-          </p:sp>
-          <p:sp>
-            <p:nvSpPr>
-              <p:cNvPr id="15" name="Retângulo: Cantos Arredondados 14">
-                <a:extLst>
-                  <a:ext uri="{FF2B5EF4-FFF2-40B4-BE49-F238E27FC236}">
-                    <a16:creationId xmlns:a16="http://schemas.microsoft.com/office/drawing/2014/main" id="{8F75668C-DE3B-4832-B093-87AE3521FC40}"/>
-                  </a:ext>
-                </a:extLst>
-              </p:cNvPr>
-              <p:cNvSpPr/>
-              <p:nvPr/>
-            </p:nvSpPr>
-            <p:spPr>
-              <a:xfrm>
-                <a:off x="1302041" y="2021746"/>
-                <a:ext cx="218114" cy="735435"/>
-              </a:xfrm>
-              <a:prstGeom prst="roundRect">
-                <a:avLst/>
-              </a:prstGeom>
-              <a:grpFill/>
-              <a:ln>
-                <a:noFill/>
-              </a:ln>
-            </p:spPr>
-            <p:style>
-              <a:lnRef idx="2">
-                <a:schemeClr val="accent1">
-                  <a:shade val="50000"/>
-                </a:schemeClr>
-              </a:lnRef>
-              <a:fillRef idx="1">
-                <a:schemeClr val="accent1"/>
-              </a:fillRef>
-              <a:effectRef idx="0">
-                <a:schemeClr val="accent1"/>
-              </a:effectRef>
-              <a:fontRef idx="minor">
-                <a:schemeClr val="lt1"/>
-              </a:fontRef>
-            </p:style>
-            <p:txBody>
-              <a:bodyPr rtlCol="0" anchor="ctr"/>
-              <a:lstStyle/>
-              <a:p>
-                <a:pPr algn="ctr"/>
-                <a:endParaRPr lang="pt-BR"/>
-              </a:p>
-            </p:txBody>
-          </p:sp>
-          <p:sp>
-            <p:nvSpPr>
-              <p:cNvPr id="16" name="Retângulo: Cantos Arredondados 15">
-                <a:extLst>
-                  <a:ext uri="{FF2B5EF4-FFF2-40B4-BE49-F238E27FC236}">
-                    <a16:creationId xmlns:a16="http://schemas.microsoft.com/office/drawing/2014/main" id="{F77488DA-7D8B-4E45-86BE-2E5DF4BD4A3A}"/>
-                  </a:ext>
-                </a:extLst>
-              </p:cNvPr>
-              <p:cNvSpPr/>
-              <p:nvPr/>
-            </p:nvSpPr>
-            <p:spPr>
-              <a:xfrm>
-                <a:off x="1697809" y="2014755"/>
-                <a:ext cx="218114" cy="735435"/>
-              </a:xfrm>
-              <a:prstGeom prst="roundRect">
-                <a:avLst/>
-              </a:prstGeom>
-              <a:grpFill/>
-              <a:ln>
-                <a:noFill/>
-              </a:ln>
-            </p:spPr>
-            <p:style>
-              <a:lnRef idx="2">
-                <a:schemeClr val="accent1">
-                  <a:shade val="50000"/>
-                </a:schemeClr>
-              </a:lnRef>
-              <a:fillRef idx="1">
-                <a:schemeClr val="accent1"/>
-              </a:fillRef>
-              <a:effectRef idx="0">
-                <a:schemeClr val="accent1"/>
-              </a:effectRef>
-              <a:fontRef idx="minor">
-                <a:schemeClr val="lt1"/>
-              </a:fontRef>
-            </p:style>
-            <p:txBody>
-              <a:bodyPr rtlCol="0" anchor="ctr"/>
-              <a:lstStyle/>
-              <a:p>
-                <a:pPr algn="ctr"/>
-                <a:endParaRPr lang="pt-BR"/>
-              </a:p>
-            </p:txBody>
-          </p:sp>
-          <p:sp>
-            <p:nvSpPr>
-              <p:cNvPr id="17" name="Retângulo: Cantos Arredondados 16">
-                <a:extLst>
-                  <a:ext uri="{FF2B5EF4-FFF2-40B4-BE49-F238E27FC236}">
-                    <a16:creationId xmlns:a16="http://schemas.microsoft.com/office/drawing/2014/main" id="{95855D4E-9787-4579-8A96-E2BB0CF567FE}"/>
-                  </a:ext>
-                </a:extLst>
-              </p:cNvPr>
-              <p:cNvSpPr/>
-              <p:nvPr/>
-            </p:nvSpPr>
-            <p:spPr>
-              <a:xfrm>
-                <a:off x="1865764" y="2056699"/>
-                <a:ext cx="218114" cy="735435"/>
-              </a:xfrm>
-              <a:prstGeom prst="roundRect">
-                <a:avLst/>
-              </a:prstGeom>
-              <a:grpFill/>
-              <a:ln>
-                <a:noFill/>
-              </a:ln>
-            </p:spPr>
-            <p:style>
-              <a:lnRef idx="2">
-                <a:schemeClr val="accent1">
-                  <a:shade val="50000"/>
-                </a:schemeClr>
-              </a:lnRef>
-              <a:fillRef idx="1">
-                <a:schemeClr val="accent1"/>
-              </a:fillRef>
-              <a:effectRef idx="0">
-                <a:schemeClr val="accent1"/>
-              </a:effectRef>
-              <a:fontRef idx="minor">
-                <a:schemeClr val="lt1"/>
-              </a:fontRef>
-            </p:style>
-            <p:txBody>
-              <a:bodyPr rtlCol="0" anchor="ctr"/>
-              <a:lstStyle/>
-              <a:p>
-                <a:pPr algn="ctr"/>
-                <a:endParaRPr lang="pt-BR" dirty="0"/>
-              </a:p>
-            </p:txBody>
-          </p:sp>
-          <p:sp>
-            <p:nvSpPr>
-              <p:cNvPr id="18" name="Retângulo: Cantos Arredondados 17">
-                <a:extLst>
-                  <a:ext uri="{FF2B5EF4-FFF2-40B4-BE49-F238E27FC236}">
-                    <a16:creationId xmlns:a16="http://schemas.microsoft.com/office/drawing/2014/main" id="{CD991848-2A23-4A4E-8201-C4E62AE9A8FE}"/>
-                  </a:ext>
-                </a:extLst>
-              </p:cNvPr>
-              <p:cNvSpPr/>
-              <p:nvPr/>
-            </p:nvSpPr>
-            <p:spPr>
-              <a:xfrm>
-                <a:off x="2065965" y="2095847"/>
-                <a:ext cx="218114" cy="735435"/>
-              </a:xfrm>
-              <a:prstGeom prst="roundRect">
-                <a:avLst/>
-              </a:prstGeom>
-              <a:grpFill/>
-              <a:ln>
-                <a:noFill/>
-              </a:ln>
-            </p:spPr>
-            <p:style>
-              <a:lnRef idx="2">
-                <a:schemeClr val="accent1">
-                  <a:shade val="50000"/>
-                </a:schemeClr>
-              </a:lnRef>
-              <a:fillRef idx="1">
-                <a:schemeClr val="accent1"/>
-              </a:fillRef>
-              <a:effectRef idx="0">
-                <a:schemeClr val="accent1"/>
-              </a:effectRef>
-              <a:fontRef idx="minor">
-                <a:schemeClr val="lt1"/>
-              </a:fontRef>
-            </p:style>
-            <p:txBody>
-              <a:bodyPr rtlCol="0" anchor="ctr"/>
-              <a:lstStyle/>
-              <a:p>
-                <a:pPr algn="ctr"/>
-                <a:endParaRPr lang="pt-BR" dirty="0"/>
-              </a:p>
-            </p:txBody>
-          </p:sp>
-          <p:sp>
-            <p:nvSpPr>
-              <p:cNvPr id="19" name="Retângulo: Cantos Arredondados 18">
-                <a:extLst>
-                  <a:ext uri="{FF2B5EF4-FFF2-40B4-BE49-F238E27FC236}">
-                    <a16:creationId xmlns:a16="http://schemas.microsoft.com/office/drawing/2014/main" id="{9E1F9F69-A0C7-4ADC-B34E-1749DC2BCD19}"/>
-                  </a:ext>
-                </a:extLst>
-              </p:cNvPr>
-              <p:cNvSpPr/>
-              <p:nvPr/>
-            </p:nvSpPr>
-            <p:spPr>
-              <a:xfrm>
-                <a:off x="2237697" y="1946245"/>
-                <a:ext cx="218114" cy="735435"/>
-              </a:xfrm>
-              <a:prstGeom prst="roundRect">
-                <a:avLst/>
-              </a:prstGeom>
-              <a:grpFill/>
-              <a:ln>
-                <a:noFill/>
-              </a:ln>
-            </p:spPr>
-            <p:style>
-              <a:lnRef idx="2">
-                <a:schemeClr val="accent1">
-                  <a:shade val="50000"/>
-                </a:schemeClr>
-              </a:lnRef>
-              <a:fillRef idx="1">
-                <a:schemeClr val="accent1"/>
-              </a:fillRef>
-              <a:effectRef idx="0">
-                <a:schemeClr val="accent1"/>
-              </a:effectRef>
-              <a:fontRef idx="minor">
-                <a:schemeClr val="lt1"/>
-              </a:fontRef>
-            </p:style>
-            <p:txBody>
-              <a:bodyPr rtlCol="0" anchor="ctr"/>
-              <a:lstStyle/>
-              <a:p>
-                <a:pPr algn="ctr"/>
-                <a:endParaRPr lang="pt-BR" dirty="0"/>
-              </a:p>
-            </p:txBody>
-          </p:sp>
-          <p:sp>
-            <p:nvSpPr>
-              <p:cNvPr id="20" name="Retângulo: Cantos Arredondados 19">
-                <a:extLst>
-                  <a:ext uri="{FF2B5EF4-FFF2-40B4-BE49-F238E27FC236}">
-                    <a16:creationId xmlns:a16="http://schemas.microsoft.com/office/drawing/2014/main" id="{F574F9BC-50DE-407D-ABC7-2E93221DE4D5}"/>
-                  </a:ext>
-                </a:extLst>
-              </p:cNvPr>
-              <p:cNvSpPr/>
-              <p:nvPr/>
-            </p:nvSpPr>
-            <p:spPr>
-              <a:xfrm>
-                <a:off x="2385225" y="1812021"/>
-                <a:ext cx="218114" cy="735435"/>
-              </a:xfrm>
-              <a:prstGeom prst="roundRect">
-                <a:avLst/>
-              </a:prstGeom>
-              <a:grpFill/>
-              <a:ln>
-                <a:noFill/>
-              </a:ln>
-            </p:spPr>
-            <p:style>
-              <a:lnRef idx="2">
-                <a:schemeClr val="accent1">
-                  <a:shade val="50000"/>
-                </a:schemeClr>
-              </a:lnRef>
-              <a:fillRef idx="1">
-                <a:schemeClr val="accent1"/>
-              </a:fillRef>
-              <a:effectRef idx="0">
-                <a:schemeClr val="accent1"/>
-              </a:effectRef>
-              <a:fontRef idx="minor">
-                <a:schemeClr val="lt1"/>
-              </a:fontRef>
-            </p:style>
-            <p:txBody>
-              <a:bodyPr rtlCol="0" anchor="ctr"/>
-              <a:lstStyle/>
-              <a:p>
-                <a:pPr algn="ctr"/>
-                <a:endParaRPr lang="pt-BR" dirty="0"/>
-              </a:p>
-            </p:txBody>
-          </p:sp>
-          <p:sp>
-            <p:nvSpPr>
-              <p:cNvPr id="21" name="Retângulo: Cantos Arredondados 20">
-                <a:extLst>
-                  <a:ext uri="{FF2B5EF4-FFF2-40B4-BE49-F238E27FC236}">
-                    <a16:creationId xmlns:a16="http://schemas.microsoft.com/office/drawing/2014/main" id="{5DDFC425-13C4-4724-A776-34A164676126}"/>
-                  </a:ext>
-                </a:extLst>
-              </p:cNvPr>
-              <p:cNvSpPr/>
-              <p:nvPr/>
-            </p:nvSpPr>
-            <p:spPr>
-              <a:xfrm>
-                <a:off x="2454936" y="1634455"/>
-                <a:ext cx="218114" cy="735435"/>
-              </a:xfrm>
-              <a:prstGeom prst="roundRect">
-                <a:avLst/>
-              </a:prstGeom>
-              <a:grpFill/>
-              <a:ln>
-                <a:noFill/>
-              </a:ln>
-            </p:spPr>
-            <p:style>
-              <a:lnRef idx="2">
-                <a:schemeClr val="accent1">
-                  <a:shade val="50000"/>
-                </a:schemeClr>
-              </a:lnRef>
-              <a:fillRef idx="1">
-                <a:schemeClr val="accent1"/>
-              </a:fillRef>
-              <a:effectRef idx="0">
-                <a:schemeClr val="accent1"/>
-              </a:effectRef>
-              <a:fontRef idx="minor">
-                <a:schemeClr val="lt1"/>
-              </a:fontRef>
-            </p:style>
-            <p:txBody>
-              <a:bodyPr rtlCol="0" anchor="ctr"/>
-              <a:lstStyle/>
-              <a:p>
-                <a:pPr algn="ctr"/>
-                <a:endParaRPr lang="pt-BR" dirty="0"/>
-              </a:p>
-            </p:txBody>
-          </p:sp>
-          <p:sp>
-            <p:nvSpPr>
-              <p:cNvPr id="22" name="Retângulo: Cantos Arredondados 21">
-                <a:extLst>
-                  <a:ext uri="{FF2B5EF4-FFF2-40B4-BE49-F238E27FC236}">
-                    <a16:creationId xmlns:a16="http://schemas.microsoft.com/office/drawing/2014/main" id="{2E72F04F-DBDE-4F18-9DE9-55494E6B413E}"/>
-                  </a:ext>
-                </a:extLst>
-              </p:cNvPr>
-              <p:cNvSpPr/>
-              <p:nvPr/>
-            </p:nvSpPr>
-            <p:spPr>
-              <a:xfrm>
-                <a:off x="1732665" y="2144781"/>
-                <a:ext cx="218114" cy="735435"/>
-              </a:xfrm>
-              <a:prstGeom prst="roundRect">
-                <a:avLst/>
-              </a:prstGeom>
-              <a:grpFill/>
-              <a:ln>
-                <a:noFill/>
-              </a:ln>
-            </p:spPr>
-            <p:style>
-              <a:lnRef idx="2">
-                <a:schemeClr val="accent1">
-                  <a:shade val="50000"/>
-                </a:schemeClr>
-              </a:lnRef>
-              <a:fillRef idx="1">
-                <a:schemeClr val="accent1"/>
-              </a:fillRef>
-              <a:effectRef idx="0">
-                <a:schemeClr val="accent1"/>
-              </a:effectRef>
-              <a:fontRef idx="minor">
-                <a:schemeClr val="lt1"/>
-              </a:fontRef>
-            </p:style>
-            <p:txBody>
-              <a:bodyPr rtlCol="0" anchor="ctr"/>
-              <a:lstStyle/>
-              <a:p>
-                <a:pPr algn="ctr"/>
-                <a:endParaRPr lang="pt-BR" dirty="0"/>
-              </a:p>
-            </p:txBody>
-          </p:sp>
-          <p:sp>
-            <p:nvSpPr>
-              <p:cNvPr id="23" name="Retângulo: Cantos Arredondados 22">
-                <a:extLst>
-                  <a:ext uri="{FF2B5EF4-FFF2-40B4-BE49-F238E27FC236}">
-                    <a16:creationId xmlns:a16="http://schemas.microsoft.com/office/drawing/2014/main" id="{BB8378C6-CD2D-408A-8997-692BF7688E0D}"/>
-                  </a:ext>
-                </a:extLst>
-              </p:cNvPr>
-              <p:cNvSpPr/>
-              <p:nvPr/>
-            </p:nvSpPr>
-            <p:spPr>
-              <a:xfrm>
-                <a:off x="1918437" y="2179733"/>
-                <a:ext cx="218114" cy="735435"/>
-              </a:xfrm>
-              <a:prstGeom prst="roundRect">
-                <a:avLst/>
-              </a:prstGeom>
-              <a:grpFill/>
-              <a:ln>
-                <a:noFill/>
-              </a:ln>
-            </p:spPr>
-            <p:style>
-              <a:lnRef idx="2">
-                <a:schemeClr val="accent1">
-                  <a:shade val="50000"/>
-                </a:schemeClr>
-              </a:lnRef>
-              <a:fillRef idx="1">
-                <a:schemeClr val="accent1"/>
-              </a:fillRef>
-              <a:effectRef idx="0">
-                <a:schemeClr val="accent1"/>
-              </a:effectRef>
-              <a:fontRef idx="minor">
-                <a:schemeClr val="lt1"/>
-              </a:fontRef>
-            </p:style>
-            <p:txBody>
-              <a:bodyPr rtlCol="0" anchor="ctr"/>
-              <a:lstStyle/>
-              <a:p>
-                <a:pPr algn="ctr"/>
-                <a:endParaRPr lang="pt-BR" dirty="0"/>
-              </a:p>
-            </p:txBody>
-          </p:sp>
+            </p:grpSpPr>
+            <p:sp>
+              <p:nvSpPr>
+                <p:cNvPr id="10" name="Elipse 9">
+                  <a:extLst>
+                    <a:ext uri="{FF2B5EF4-FFF2-40B4-BE49-F238E27FC236}">
+                      <a16:creationId xmlns:a16="http://schemas.microsoft.com/office/drawing/2014/main" id="{8AA4CB02-361D-40B7-B5E9-E7F2EFF87374}"/>
+                    </a:ext>
+                  </a:extLst>
+                </p:cNvPr>
+                <p:cNvSpPr/>
+                <p:nvPr/>
+              </p:nvSpPr>
+              <p:spPr>
+                <a:xfrm>
+                  <a:off x="997241" y="468386"/>
+                  <a:ext cx="1675809" cy="2362897"/>
+                </a:xfrm>
+                <a:prstGeom prst="ellipse">
+                  <a:avLst/>
+                </a:prstGeom>
+                <a:grpFill/>
+                <a:ln>
+                  <a:noFill/>
+                </a:ln>
+              </p:spPr>
+              <p:style>
+                <a:lnRef idx="2">
+                  <a:schemeClr val="accent1">
+                    <a:shade val="50000"/>
+                  </a:schemeClr>
+                </a:lnRef>
+                <a:fillRef idx="1">
+                  <a:schemeClr val="accent1"/>
+                </a:fillRef>
+                <a:effectRef idx="0">
+                  <a:schemeClr val="accent1"/>
+                </a:effectRef>
+                <a:fontRef idx="minor">
+                  <a:schemeClr val="lt1"/>
+                </a:fontRef>
+              </p:style>
+              <p:txBody>
+                <a:bodyPr rtlCol="0" anchor="ctr"/>
+                <a:lstStyle/>
+                <a:p>
+                  <a:pPr algn="ctr"/>
+                  <a:endParaRPr lang="pt-BR"/>
+                </a:p>
+              </p:txBody>
+            </p:sp>
+            <p:sp>
+              <p:nvSpPr>
+                <p:cNvPr id="11" name="Retângulo: Cantos Arredondados 10">
+                  <a:extLst>
+                    <a:ext uri="{FF2B5EF4-FFF2-40B4-BE49-F238E27FC236}">
+                      <a16:creationId xmlns:a16="http://schemas.microsoft.com/office/drawing/2014/main" id="{F73250F2-2986-478D-84CC-876DADF39F25}"/>
+                    </a:ext>
+                  </a:extLst>
+                </p:cNvPr>
+                <p:cNvSpPr/>
+                <p:nvPr/>
+              </p:nvSpPr>
+              <p:spPr>
+                <a:xfrm>
+                  <a:off x="997241" y="1716946"/>
+                  <a:ext cx="218114" cy="735435"/>
+                </a:xfrm>
+                <a:prstGeom prst="roundRect">
+                  <a:avLst/>
+                </a:prstGeom>
+                <a:grpFill/>
+                <a:ln>
+                  <a:noFill/>
+                </a:ln>
+              </p:spPr>
+              <p:style>
+                <a:lnRef idx="2">
+                  <a:schemeClr val="accent1">
+                    <a:shade val="50000"/>
+                  </a:schemeClr>
+                </a:lnRef>
+                <a:fillRef idx="1">
+                  <a:schemeClr val="accent1"/>
+                </a:fillRef>
+                <a:effectRef idx="0">
+                  <a:schemeClr val="accent1"/>
+                </a:effectRef>
+                <a:fontRef idx="minor">
+                  <a:schemeClr val="lt1"/>
+                </a:fontRef>
+              </p:style>
+              <p:txBody>
+                <a:bodyPr rtlCol="0" anchor="ctr"/>
+                <a:lstStyle/>
+                <a:p>
+                  <a:pPr algn="ctr"/>
+                  <a:endParaRPr lang="pt-BR"/>
+                </a:p>
+              </p:txBody>
+            </p:sp>
+            <p:sp>
+              <p:nvSpPr>
+                <p:cNvPr id="12" name="Retângulo: Cantos Arredondados 11">
+                  <a:extLst>
+                    <a:ext uri="{FF2B5EF4-FFF2-40B4-BE49-F238E27FC236}">
+                      <a16:creationId xmlns:a16="http://schemas.microsoft.com/office/drawing/2014/main" id="{61FF627D-32B0-443C-AF22-BB6C5CF00724}"/>
+                    </a:ext>
+                  </a:extLst>
+                </p:cNvPr>
+                <p:cNvSpPr/>
+                <p:nvPr/>
+              </p:nvSpPr>
+              <p:spPr>
+                <a:xfrm>
+                  <a:off x="1165196" y="1849772"/>
+                  <a:ext cx="218114" cy="735435"/>
+                </a:xfrm>
+                <a:prstGeom prst="roundRect">
+                  <a:avLst/>
+                </a:prstGeom>
+                <a:grpFill/>
+                <a:ln>
+                  <a:noFill/>
+                </a:ln>
+              </p:spPr>
+              <p:style>
+                <a:lnRef idx="2">
+                  <a:schemeClr val="accent1">
+                    <a:shade val="50000"/>
+                  </a:schemeClr>
+                </a:lnRef>
+                <a:fillRef idx="1">
+                  <a:schemeClr val="accent1"/>
+                </a:fillRef>
+                <a:effectRef idx="0">
+                  <a:schemeClr val="accent1"/>
+                </a:effectRef>
+                <a:fontRef idx="minor">
+                  <a:schemeClr val="lt1"/>
+                </a:fontRef>
+              </p:style>
+              <p:txBody>
+                <a:bodyPr rtlCol="0" anchor="ctr"/>
+                <a:lstStyle/>
+                <a:p>
+                  <a:pPr algn="ctr"/>
+                  <a:endParaRPr lang="pt-BR"/>
+                </a:p>
+              </p:txBody>
+            </p:sp>
+            <p:sp>
+              <p:nvSpPr>
+                <p:cNvPr id="13" name="Retângulo: Cantos Arredondados 12">
+                  <a:extLst>
+                    <a:ext uri="{FF2B5EF4-FFF2-40B4-BE49-F238E27FC236}">
+                      <a16:creationId xmlns:a16="http://schemas.microsoft.com/office/drawing/2014/main" id="{FCBC6A68-B0BD-4771-B12B-2666385ADC6F}"/>
+                    </a:ext>
+                  </a:extLst>
+                </p:cNvPr>
+                <p:cNvSpPr/>
+                <p:nvPr/>
+              </p:nvSpPr>
+              <p:spPr>
+                <a:xfrm>
+                  <a:off x="1492323" y="2095848"/>
+                  <a:ext cx="218114" cy="735435"/>
+                </a:xfrm>
+                <a:prstGeom prst="roundRect">
+                  <a:avLst/>
+                </a:prstGeom>
+                <a:grpFill/>
+                <a:ln>
+                  <a:noFill/>
+                </a:ln>
+              </p:spPr>
+              <p:style>
+                <a:lnRef idx="2">
+                  <a:schemeClr val="accent1">
+                    <a:shade val="50000"/>
+                  </a:schemeClr>
+                </a:lnRef>
+                <a:fillRef idx="1">
+                  <a:schemeClr val="accent1"/>
+                </a:fillRef>
+                <a:effectRef idx="0">
+                  <a:schemeClr val="accent1"/>
+                </a:effectRef>
+                <a:fontRef idx="minor">
+                  <a:schemeClr val="lt1"/>
+                </a:fontRef>
+              </p:style>
+              <p:txBody>
+                <a:bodyPr rtlCol="0" anchor="ctr"/>
+                <a:lstStyle/>
+                <a:p>
+                  <a:pPr algn="ctr"/>
+                  <a:endParaRPr lang="pt-BR"/>
+                </a:p>
+              </p:txBody>
+            </p:sp>
+            <p:sp>
+              <p:nvSpPr>
+                <p:cNvPr id="14" name="Retângulo: Cantos Arredondados 13">
+                  <a:extLst>
+                    <a:ext uri="{FF2B5EF4-FFF2-40B4-BE49-F238E27FC236}">
+                      <a16:creationId xmlns:a16="http://schemas.microsoft.com/office/drawing/2014/main" id="{69F32E65-17C4-4CC9-9EA0-529687A215BF}"/>
+                    </a:ext>
+                  </a:extLst>
+                </p:cNvPr>
+                <p:cNvSpPr/>
+                <p:nvPr/>
+              </p:nvSpPr>
+              <p:spPr>
+                <a:xfrm>
+                  <a:off x="1149641" y="1869346"/>
+                  <a:ext cx="218114" cy="735435"/>
+                </a:xfrm>
+                <a:prstGeom prst="roundRect">
+                  <a:avLst/>
+                </a:prstGeom>
+                <a:grpFill/>
+                <a:ln>
+                  <a:noFill/>
+                </a:ln>
+              </p:spPr>
+              <p:style>
+                <a:lnRef idx="2">
+                  <a:schemeClr val="accent1">
+                    <a:shade val="50000"/>
+                  </a:schemeClr>
+                </a:lnRef>
+                <a:fillRef idx="1">
+                  <a:schemeClr val="accent1"/>
+                </a:fillRef>
+                <a:effectRef idx="0">
+                  <a:schemeClr val="accent1"/>
+                </a:effectRef>
+                <a:fontRef idx="minor">
+                  <a:schemeClr val="lt1"/>
+                </a:fontRef>
+              </p:style>
+              <p:txBody>
+                <a:bodyPr rtlCol="0" anchor="ctr"/>
+                <a:lstStyle/>
+                <a:p>
+                  <a:pPr algn="ctr"/>
+                  <a:endParaRPr lang="pt-BR"/>
+                </a:p>
+              </p:txBody>
+            </p:sp>
+            <p:sp>
+              <p:nvSpPr>
+                <p:cNvPr id="15" name="Retângulo: Cantos Arredondados 14">
+                  <a:extLst>
+                    <a:ext uri="{FF2B5EF4-FFF2-40B4-BE49-F238E27FC236}">
+                      <a16:creationId xmlns:a16="http://schemas.microsoft.com/office/drawing/2014/main" id="{8F75668C-DE3B-4832-B093-87AE3521FC40}"/>
+                    </a:ext>
+                  </a:extLst>
+                </p:cNvPr>
+                <p:cNvSpPr/>
+                <p:nvPr/>
+              </p:nvSpPr>
+              <p:spPr>
+                <a:xfrm>
+                  <a:off x="1302041" y="2021746"/>
+                  <a:ext cx="218114" cy="735435"/>
+                </a:xfrm>
+                <a:prstGeom prst="roundRect">
+                  <a:avLst/>
+                </a:prstGeom>
+                <a:grpFill/>
+                <a:ln>
+                  <a:noFill/>
+                </a:ln>
+              </p:spPr>
+              <p:style>
+                <a:lnRef idx="2">
+                  <a:schemeClr val="accent1">
+                    <a:shade val="50000"/>
+                  </a:schemeClr>
+                </a:lnRef>
+                <a:fillRef idx="1">
+                  <a:schemeClr val="accent1"/>
+                </a:fillRef>
+                <a:effectRef idx="0">
+                  <a:schemeClr val="accent1"/>
+                </a:effectRef>
+                <a:fontRef idx="minor">
+                  <a:schemeClr val="lt1"/>
+                </a:fontRef>
+              </p:style>
+              <p:txBody>
+                <a:bodyPr rtlCol="0" anchor="ctr"/>
+                <a:lstStyle/>
+                <a:p>
+                  <a:pPr algn="ctr"/>
+                  <a:endParaRPr lang="pt-BR"/>
+                </a:p>
+              </p:txBody>
+            </p:sp>
+            <p:sp>
+              <p:nvSpPr>
+                <p:cNvPr id="16" name="Retângulo: Cantos Arredondados 15">
+                  <a:extLst>
+                    <a:ext uri="{FF2B5EF4-FFF2-40B4-BE49-F238E27FC236}">
+                      <a16:creationId xmlns:a16="http://schemas.microsoft.com/office/drawing/2014/main" id="{F77488DA-7D8B-4E45-86BE-2E5DF4BD4A3A}"/>
+                    </a:ext>
+                  </a:extLst>
+                </p:cNvPr>
+                <p:cNvSpPr/>
+                <p:nvPr/>
+              </p:nvSpPr>
+              <p:spPr>
+                <a:xfrm>
+                  <a:off x="1697809" y="2014755"/>
+                  <a:ext cx="218114" cy="735435"/>
+                </a:xfrm>
+                <a:prstGeom prst="roundRect">
+                  <a:avLst/>
+                </a:prstGeom>
+                <a:grpFill/>
+                <a:ln>
+                  <a:noFill/>
+                </a:ln>
+              </p:spPr>
+              <p:style>
+                <a:lnRef idx="2">
+                  <a:schemeClr val="accent1">
+                    <a:shade val="50000"/>
+                  </a:schemeClr>
+                </a:lnRef>
+                <a:fillRef idx="1">
+                  <a:schemeClr val="accent1"/>
+                </a:fillRef>
+                <a:effectRef idx="0">
+                  <a:schemeClr val="accent1"/>
+                </a:effectRef>
+                <a:fontRef idx="minor">
+                  <a:schemeClr val="lt1"/>
+                </a:fontRef>
+              </p:style>
+              <p:txBody>
+                <a:bodyPr rtlCol="0" anchor="ctr"/>
+                <a:lstStyle/>
+                <a:p>
+                  <a:pPr algn="ctr"/>
+                  <a:endParaRPr lang="pt-BR"/>
+                </a:p>
+              </p:txBody>
+            </p:sp>
+            <p:sp>
+              <p:nvSpPr>
+                <p:cNvPr id="17" name="Retângulo: Cantos Arredondados 16">
+                  <a:extLst>
+                    <a:ext uri="{FF2B5EF4-FFF2-40B4-BE49-F238E27FC236}">
+                      <a16:creationId xmlns:a16="http://schemas.microsoft.com/office/drawing/2014/main" id="{95855D4E-9787-4579-8A96-E2BB0CF567FE}"/>
+                    </a:ext>
+                  </a:extLst>
+                </p:cNvPr>
+                <p:cNvSpPr/>
+                <p:nvPr/>
+              </p:nvSpPr>
+              <p:spPr>
+                <a:xfrm>
+                  <a:off x="1865764" y="2056699"/>
+                  <a:ext cx="218114" cy="735435"/>
+                </a:xfrm>
+                <a:prstGeom prst="roundRect">
+                  <a:avLst/>
+                </a:prstGeom>
+                <a:grpFill/>
+                <a:ln>
+                  <a:noFill/>
+                </a:ln>
+              </p:spPr>
+              <p:style>
+                <a:lnRef idx="2">
+                  <a:schemeClr val="accent1">
+                    <a:shade val="50000"/>
+                  </a:schemeClr>
+                </a:lnRef>
+                <a:fillRef idx="1">
+                  <a:schemeClr val="accent1"/>
+                </a:fillRef>
+                <a:effectRef idx="0">
+                  <a:schemeClr val="accent1"/>
+                </a:effectRef>
+                <a:fontRef idx="minor">
+                  <a:schemeClr val="lt1"/>
+                </a:fontRef>
+              </p:style>
+              <p:txBody>
+                <a:bodyPr rtlCol="0" anchor="ctr"/>
+                <a:lstStyle/>
+                <a:p>
+                  <a:pPr algn="ctr"/>
+                  <a:endParaRPr lang="pt-BR" dirty="0"/>
+                </a:p>
+              </p:txBody>
+            </p:sp>
+            <p:sp>
+              <p:nvSpPr>
+                <p:cNvPr id="18" name="Retângulo: Cantos Arredondados 17">
+                  <a:extLst>
+                    <a:ext uri="{FF2B5EF4-FFF2-40B4-BE49-F238E27FC236}">
+                      <a16:creationId xmlns:a16="http://schemas.microsoft.com/office/drawing/2014/main" id="{CD991848-2A23-4A4E-8201-C4E62AE9A8FE}"/>
+                    </a:ext>
+                  </a:extLst>
+                </p:cNvPr>
+                <p:cNvSpPr/>
+                <p:nvPr/>
+              </p:nvSpPr>
+              <p:spPr>
+                <a:xfrm>
+                  <a:off x="2065965" y="2095847"/>
+                  <a:ext cx="218114" cy="735435"/>
+                </a:xfrm>
+                <a:prstGeom prst="roundRect">
+                  <a:avLst/>
+                </a:prstGeom>
+                <a:grpFill/>
+                <a:ln>
+                  <a:noFill/>
+                </a:ln>
+              </p:spPr>
+              <p:style>
+                <a:lnRef idx="2">
+                  <a:schemeClr val="accent1">
+                    <a:shade val="50000"/>
+                  </a:schemeClr>
+                </a:lnRef>
+                <a:fillRef idx="1">
+                  <a:schemeClr val="accent1"/>
+                </a:fillRef>
+                <a:effectRef idx="0">
+                  <a:schemeClr val="accent1"/>
+                </a:effectRef>
+                <a:fontRef idx="minor">
+                  <a:schemeClr val="lt1"/>
+                </a:fontRef>
+              </p:style>
+              <p:txBody>
+                <a:bodyPr rtlCol="0" anchor="ctr"/>
+                <a:lstStyle/>
+                <a:p>
+                  <a:pPr algn="ctr"/>
+                  <a:endParaRPr lang="pt-BR" dirty="0"/>
+                </a:p>
+              </p:txBody>
+            </p:sp>
+            <p:sp>
+              <p:nvSpPr>
+                <p:cNvPr id="19" name="Retângulo: Cantos Arredondados 18">
+                  <a:extLst>
+                    <a:ext uri="{FF2B5EF4-FFF2-40B4-BE49-F238E27FC236}">
+                      <a16:creationId xmlns:a16="http://schemas.microsoft.com/office/drawing/2014/main" id="{9E1F9F69-A0C7-4ADC-B34E-1749DC2BCD19}"/>
+                    </a:ext>
+                  </a:extLst>
+                </p:cNvPr>
+                <p:cNvSpPr/>
+                <p:nvPr/>
+              </p:nvSpPr>
+              <p:spPr>
+                <a:xfrm>
+                  <a:off x="2237697" y="1946245"/>
+                  <a:ext cx="218114" cy="735435"/>
+                </a:xfrm>
+                <a:prstGeom prst="roundRect">
+                  <a:avLst/>
+                </a:prstGeom>
+                <a:grpFill/>
+                <a:ln>
+                  <a:noFill/>
+                </a:ln>
+              </p:spPr>
+              <p:style>
+                <a:lnRef idx="2">
+                  <a:schemeClr val="accent1">
+                    <a:shade val="50000"/>
+                  </a:schemeClr>
+                </a:lnRef>
+                <a:fillRef idx="1">
+                  <a:schemeClr val="accent1"/>
+                </a:fillRef>
+                <a:effectRef idx="0">
+                  <a:schemeClr val="accent1"/>
+                </a:effectRef>
+                <a:fontRef idx="minor">
+                  <a:schemeClr val="lt1"/>
+                </a:fontRef>
+              </p:style>
+              <p:txBody>
+                <a:bodyPr rtlCol="0" anchor="ctr"/>
+                <a:lstStyle/>
+                <a:p>
+                  <a:pPr algn="ctr"/>
+                  <a:endParaRPr lang="pt-BR" dirty="0"/>
+                </a:p>
+              </p:txBody>
+            </p:sp>
+            <p:sp>
+              <p:nvSpPr>
+                <p:cNvPr id="20" name="Retângulo: Cantos Arredondados 19">
+                  <a:extLst>
+                    <a:ext uri="{FF2B5EF4-FFF2-40B4-BE49-F238E27FC236}">
+                      <a16:creationId xmlns:a16="http://schemas.microsoft.com/office/drawing/2014/main" id="{F574F9BC-50DE-407D-ABC7-2E93221DE4D5}"/>
+                    </a:ext>
+                  </a:extLst>
+                </p:cNvPr>
+                <p:cNvSpPr/>
+                <p:nvPr/>
+              </p:nvSpPr>
+              <p:spPr>
+                <a:xfrm>
+                  <a:off x="2385225" y="1812021"/>
+                  <a:ext cx="218114" cy="735435"/>
+                </a:xfrm>
+                <a:prstGeom prst="roundRect">
+                  <a:avLst/>
+                </a:prstGeom>
+                <a:grpFill/>
+                <a:ln>
+                  <a:noFill/>
+                </a:ln>
+              </p:spPr>
+              <p:style>
+                <a:lnRef idx="2">
+                  <a:schemeClr val="accent1">
+                    <a:shade val="50000"/>
+                  </a:schemeClr>
+                </a:lnRef>
+                <a:fillRef idx="1">
+                  <a:schemeClr val="accent1"/>
+                </a:fillRef>
+                <a:effectRef idx="0">
+                  <a:schemeClr val="accent1"/>
+                </a:effectRef>
+                <a:fontRef idx="minor">
+                  <a:schemeClr val="lt1"/>
+                </a:fontRef>
+              </p:style>
+              <p:txBody>
+                <a:bodyPr rtlCol="0" anchor="ctr"/>
+                <a:lstStyle/>
+                <a:p>
+                  <a:pPr algn="ctr"/>
+                  <a:endParaRPr lang="pt-BR" dirty="0"/>
+                </a:p>
+              </p:txBody>
+            </p:sp>
+            <p:sp>
+              <p:nvSpPr>
+                <p:cNvPr id="21" name="Retângulo: Cantos Arredondados 20">
+                  <a:extLst>
+                    <a:ext uri="{FF2B5EF4-FFF2-40B4-BE49-F238E27FC236}">
+                      <a16:creationId xmlns:a16="http://schemas.microsoft.com/office/drawing/2014/main" id="{5DDFC425-13C4-4724-A776-34A164676126}"/>
+                    </a:ext>
+                  </a:extLst>
+                </p:cNvPr>
+                <p:cNvSpPr/>
+                <p:nvPr/>
+              </p:nvSpPr>
+              <p:spPr>
+                <a:xfrm>
+                  <a:off x="2454936" y="1634455"/>
+                  <a:ext cx="218114" cy="735435"/>
+                </a:xfrm>
+                <a:prstGeom prst="roundRect">
+                  <a:avLst/>
+                </a:prstGeom>
+                <a:grpFill/>
+                <a:ln>
+                  <a:noFill/>
+                </a:ln>
+              </p:spPr>
+              <p:style>
+                <a:lnRef idx="2">
+                  <a:schemeClr val="accent1">
+                    <a:shade val="50000"/>
+                  </a:schemeClr>
+                </a:lnRef>
+                <a:fillRef idx="1">
+                  <a:schemeClr val="accent1"/>
+                </a:fillRef>
+                <a:effectRef idx="0">
+                  <a:schemeClr val="accent1"/>
+                </a:effectRef>
+                <a:fontRef idx="minor">
+                  <a:schemeClr val="lt1"/>
+                </a:fontRef>
+              </p:style>
+              <p:txBody>
+                <a:bodyPr rtlCol="0" anchor="ctr"/>
+                <a:lstStyle/>
+                <a:p>
+                  <a:pPr algn="ctr"/>
+                  <a:endParaRPr lang="pt-BR" dirty="0"/>
+                </a:p>
+              </p:txBody>
+            </p:sp>
+            <p:sp>
+              <p:nvSpPr>
+                <p:cNvPr id="22" name="Retângulo: Cantos Arredondados 21">
+                  <a:extLst>
+                    <a:ext uri="{FF2B5EF4-FFF2-40B4-BE49-F238E27FC236}">
+                      <a16:creationId xmlns:a16="http://schemas.microsoft.com/office/drawing/2014/main" id="{2E72F04F-DBDE-4F18-9DE9-55494E6B413E}"/>
+                    </a:ext>
+                  </a:extLst>
+                </p:cNvPr>
+                <p:cNvSpPr/>
+                <p:nvPr/>
+              </p:nvSpPr>
+              <p:spPr>
+                <a:xfrm>
+                  <a:off x="1732665" y="2144781"/>
+                  <a:ext cx="218114" cy="735435"/>
+                </a:xfrm>
+                <a:prstGeom prst="roundRect">
+                  <a:avLst/>
+                </a:prstGeom>
+                <a:grpFill/>
+                <a:ln>
+                  <a:noFill/>
+                </a:ln>
+              </p:spPr>
+              <p:style>
+                <a:lnRef idx="2">
+                  <a:schemeClr val="accent1">
+                    <a:shade val="50000"/>
+                  </a:schemeClr>
+                </a:lnRef>
+                <a:fillRef idx="1">
+                  <a:schemeClr val="accent1"/>
+                </a:fillRef>
+                <a:effectRef idx="0">
+                  <a:schemeClr val="accent1"/>
+                </a:effectRef>
+                <a:fontRef idx="minor">
+                  <a:schemeClr val="lt1"/>
+                </a:fontRef>
+              </p:style>
+              <p:txBody>
+                <a:bodyPr rtlCol="0" anchor="ctr"/>
+                <a:lstStyle/>
+                <a:p>
+                  <a:pPr algn="ctr"/>
+                  <a:endParaRPr lang="pt-BR" dirty="0"/>
+                </a:p>
+              </p:txBody>
+            </p:sp>
+            <p:sp>
+              <p:nvSpPr>
+                <p:cNvPr id="23" name="Retângulo: Cantos Arredondados 22">
+                  <a:extLst>
+                    <a:ext uri="{FF2B5EF4-FFF2-40B4-BE49-F238E27FC236}">
+                      <a16:creationId xmlns:a16="http://schemas.microsoft.com/office/drawing/2014/main" id="{BB8378C6-CD2D-408A-8997-692BF7688E0D}"/>
+                    </a:ext>
+                  </a:extLst>
+                </p:cNvPr>
+                <p:cNvSpPr/>
+                <p:nvPr/>
+              </p:nvSpPr>
+              <p:spPr>
+                <a:xfrm>
+                  <a:off x="1918437" y="2179733"/>
+                  <a:ext cx="218114" cy="735435"/>
+                </a:xfrm>
+                <a:prstGeom prst="roundRect">
+                  <a:avLst/>
+                </a:prstGeom>
+                <a:grpFill/>
+                <a:ln>
+                  <a:noFill/>
+                </a:ln>
+              </p:spPr>
+              <p:style>
+                <a:lnRef idx="2">
+                  <a:schemeClr val="accent1">
+                    <a:shade val="50000"/>
+                  </a:schemeClr>
+                </a:lnRef>
+                <a:fillRef idx="1">
+                  <a:schemeClr val="accent1"/>
+                </a:fillRef>
+                <a:effectRef idx="0">
+                  <a:schemeClr val="accent1"/>
+                </a:effectRef>
+                <a:fontRef idx="minor">
+                  <a:schemeClr val="lt1"/>
+                </a:fontRef>
+              </p:style>
+              <p:txBody>
+                <a:bodyPr rtlCol="0" anchor="ctr"/>
+                <a:lstStyle/>
+                <a:p>
+                  <a:pPr algn="ctr"/>
+                  <a:endParaRPr lang="pt-BR" dirty="0"/>
+                </a:p>
+              </p:txBody>
+            </p:sp>
+          </p:grpSp>
         </p:grpSp>
       </p:grpSp>
     </p:spTree>

</xml_diff>